<commit_message>
Updated trainer presentation - Microsoft solution
</commit_message>
<xml_diff>
--- a/Whiteboard design session/WDS trainer presentation - Continuous delivery in Azure DevOps.pptx
+++ b/Whiteboard design session/WDS trainer presentation - Continuous delivery in Azure DevOps.pptx
@@ -231,7 +231,7 @@
           <a:p>
             <a:fld id="{52A13B17-C506-4D51-BB37-16B365906619}" type="datetimeFigureOut">
               <a:rPr lang="en-US" smtClean="0"/>
-              <a:t>8/28/19</a:t>
+              <a:t>9/25/2019</a:t>
             </a:fld>
             <a:endParaRPr lang="en-US" dirty="0"/>
           </a:p>
@@ -1449,7 +1449,10 @@
           <a:bodyPr/>
           <a:lstStyle/>
           <a:p>
-            <a:endParaRPr lang="en-US" dirty="0"/>
+            <a:r>
+              <a:rPr lang="en-US" dirty="0"/>
+              <a:t>Inside Azure DevOps you create a single build definition, that can build on any branch. This build definition will then trigger 3 times, one for the task branch that is pushed to Azure DevOps, one for the pull request which does a build based on the upcoming merge, and then the final build on the master after the pull request have been merged</a:t>
+            </a:r>
           </a:p>
         </p:txBody>
       </p:sp>
@@ -3237,7 +3240,7 @@
                   <a:prstClr val="black"/>
                 </a:solidFill>
               </a:rPr>
-              <a:t>8/28/19 4:26 PM</a:t>
+              <a:t>9/25/2019 9:54 AM</a:t>
             </a:fld>
             <a:endParaRPr lang="en-US" dirty="0">
               <a:solidFill>
@@ -18084,7 +18087,7 @@
             <p:nvPr/>
           </p:nvPicPr>
           <p:blipFill>
-            <a:blip r:embed="rId3">
+            <a:blip r:embed="rId3" cstate="print">
               <a:extLst>
                 <a:ext uri="{28A0092B-C50C-407E-A947-70E740481C1C}">
                   <a14:useLocalDpi xmlns:a14="http://schemas.microsoft.com/office/drawing/2010/main" val="0"/>
@@ -18225,7 +18228,7 @@
             <p:nvPr/>
           </p:nvPicPr>
           <p:blipFill>
-            <a:blip r:embed="rId4">
+            <a:blip r:embed="rId4" cstate="print">
               <a:extLst>
                 <a:ext uri="{28A0092B-C50C-407E-A947-70E740481C1C}">
                   <a14:useLocalDpi xmlns:a14="http://schemas.microsoft.com/office/drawing/2010/main" val="0"/>
@@ -20748,10 +20751,10 @@
         </p:nvGrpSpPr>
         <p:grpSpPr>
           <a:xfrm>
-            <a:off x="340550" y="1958796"/>
-            <a:ext cx="11128289" cy="3164850"/>
-            <a:chOff x="340550" y="1958796"/>
-            <a:chExt cx="11128289" cy="3164850"/>
+            <a:off x="340550" y="1958795"/>
+            <a:ext cx="11128289" cy="3340654"/>
+            <a:chOff x="340550" y="1958795"/>
+            <a:chExt cx="11128289" cy="3340654"/>
           </a:xfrm>
         </p:grpSpPr>
         <p:grpSp>
@@ -20768,10 +20771,10 @@
           </p:nvGrpSpPr>
           <p:grpSpPr>
             <a:xfrm>
-              <a:off x="340550" y="1958796"/>
-              <a:ext cx="11128289" cy="3164850"/>
-              <a:chOff x="340550" y="1958796"/>
-              <a:chExt cx="11128289" cy="3164850"/>
+              <a:off x="340550" y="1958795"/>
+              <a:ext cx="11128289" cy="3340654"/>
+              <a:chOff x="340550" y="1958795"/>
+              <a:chExt cx="11128289" cy="3340654"/>
             </a:xfrm>
           </p:grpSpPr>
           <p:sp>
@@ -20788,8 +20791,8 @@
             </p:nvSpPr>
             <p:spPr bwMode="auto">
               <a:xfrm>
-                <a:off x="458786" y="1958796"/>
-                <a:ext cx="11010053" cy="3164850"/>
+                <a:off x="458786" y="1958795"/>
+                <a:ext cx="11010053" cy="3340653"/>
               </a:xfrm>
               <a:prstGeom prst="rect">
                 <a:avLst/>
@@ -20871,8 +20874,8 @@
             </p:nvSpPr>
             <p:spPr bwMode="auto">
               <a:xfrm>
-                <a:off x="2485002" y="2260710"/>
-                <a:ext cx="5425958" cy="2480181"/>
+                <a:off x="2154753" y="2260710"/>
+                <a:ext cx="5756207" cy="2862931"/>
               </a:xfrm>
               <a:prstGeom prst="rect">
                 <a:avLst/>
@@ -21006,7 +21009,7 @@
             </p:nvSpPr>
             <p:spPr>
               <a:xfrm>
-                <a:off x="1176624" y="3547434"/>
+                <a:off x="1009808" y="3552605"/>
                 <a:ext cx="1317555" cy="904863"/>
               </a:xfrm>
               <a:prstGeom prst="rect">
@@ -21069,7 +21072,7 @@
             </p:blipFill>
             <p:spPr>
               <a:xfrm>
-                <a:off x="1546180" y="3080444"/>
+                <a:off x="1400870" y="3227975"/>
                 <a:ext cx="472161" cy="472161"/>
               </a:xfrm>
               <a:prstGeom prst="rect">
@@ -21105,7 +21108,7 @@
             </p:blipFill>
             <p:spPr>
               <a:xfrm>
-                <a:off x="548867" y="3127600"/>
+                <a:off x="542525" y="3248931"/>
                 <a:ext cx="417499" cy="417499"/>
               </a:xfrm>
               <a:prstGeom prst="rect">
@@ -21176,8 +21179,8 @@
             </p:nvSpPr>
             <p:spPr bwMode="auto">
               <a:xfrm>
-                <a:off x="5092862" y="3121001"/>
-                <a:ext cx="959283" cy="767928"/>
+                <a:off x="3187463" y="4245674"/>
+                <a:ext cx="1203626" cy="582974"/>
               </a:xfrm>
               <a:prstGeom prst="rect">
                 <a:avLst/>
@@ -21243,7 +21246,39 @@
                     <a:ea typeface="Segoe UI" pitchFamily="34" charset="0"/>
                     <a:cs typeface="Arial" panose="020B0604020202020204" pitchFamily="34" charset="0"/>
                   </a:rPr>
-                  <a:t>Build (+tests)</a:t>
+                  <a:t>Build def</a:t>
+                </a:r>
+              </a:p>
+              <a:p>
+                <a:pPr algn="ctr" defTabSz="932472" fontAlgn="base">
+                  <a:lnSpc>
+                    <a:spcPct val="90000"/>
+                  </a:lnSpc>
+                  <a:spcBef>
+                    <a:spcPct val="0"/>
+                  </a:spcBef>
+                  <a:spcAft>
+                    <a:spcPct val="0"/>
+                  </a:spcAft>
+                </a:pPr>
+                <a:r>
+                  <a:rPr lang="en-US" sz="1200" dirty="0">
+                    <a:gradFill>
+                      <a:gsLst>
+                        <a:gs pos="0">
+                          <a:srgbClr val="FFFFFF"/>
+                        </a:gs>
+                        <a:gs pos="100000">
+                          <a:srgbClr val="FFFFFF"/>
+                        </a:gs>
+                      </a:gsLst>
+                      <a:lin ang="5400000" scaled="0"/>
+                    </a:gradFill>
+                    <a:latin typeface="Arial" panose="020B0604020202020204" pitchFamily="34" charset="0"/>
+                    <a:ea typeface="Segoe UI" pitchFamily="34" charset="0"/>
+                    <a:cs typeface="Arial" panose="020B0604020202020204" pitchFamily="34" charset="0"/>
+                  </a:rPr>
+                  <a:t>  ( incl tests)</a:t>
                 </a:r>
               </a:p>
             </p:txBody>
@@ -21348,8 +21383,8 @@
             </p:nvSpPr>
             <p:spPr>
               <a:xfrm>
-                <a:off x="5008146" y="3827099"/>
-                <a:ext cx="1128713" cy="600164"/>
+                <a:off x="2764995" y="4699285"/>
+                <a:ext cx="2119744" cy="600164"/>
               </a:xfrm>
               <a:prstGeom prst="rect">
                 <a:avLst/>
@@ -21378,7 +21413,7 @@
                     <a:latin typeface="Arial" panose="020B0604020202020204" pitchFamily="34" charset="0"/>
                     <a:cs typeface="Arial" panose="020B0604020202020204" pitchFamily="34" charset="0"/>
                   </a:rPr>
-                  <a:t>Continuous Integration</a:t>
+                  <a:t>Continuous Integration (single build definition)</a:t>
                 </a:r>
               </a:p>
             </p:txBody>
@@ -22163,9 +22198,9 @@
               <p:nvPr/>
             </p:nvCxnSpPr>
             <p:spPr>
-              <a:xfrm flipV="1">
-                <a:off x="4529418" y="3467199"/>
-                <a:ext cx="549631" cy="382"/>
+              <a:xfrm>
+                <a:off x="5059567" y="3445176"/>
+                <a:ext cx="371401" cy="881"/>
               </a:xfrm>
               <a:prstGeom prst="straightConnector1">
                 <a:avLst/>
@@ -22209,7 +22244,7 @@
             </p:nvSpPr>
             <p:spPr>
               <a:xfrm>
-                <a:off x="2479144" y="3539599"/>
+                <a:off x="2814278" y="3531204"/>
                 <a:ext cx="1320599" cy="752514"/>
               </a:xfrm>
               <a:prstGeom prst="rect">
@@ -22272,7 +22307,7 @@
             </p:blipFill>
             <p:spPr>
               <a:xfrm>
-                <a:off x="2883857" y="3072609"/>
+                <a:off x="3135296" y="3211426"/>
                 <a:ext cx="472161" cy="472161"/>
               </a:xfrm>
               <a:prstGeom prst="rect">
@@ -22294,7 +22329,7 @@
             </p:nvSpPr>
             <p:spPr>
               <a:xfrm>
-                <a:off x="3564140" y="3550407"/>
+                <a:off x="4182161" y="3610907"/>
                 <a:ext cx="1320599" cy="600164"/>
               </a:xfrm>
               <a:prstGeom prst="rect">
@@ -22357,7 +22392,7 @@
             </p:blipFill>
             <p:spPr>
               <a:xfrm>
-                <a:off x="3968853" y="3083417"/>
+                <a:off x="4693989" y="3211109"/>
                 <a:ext cx="472161" cy="472161"/>
               </a:xfrm>
               <a:prstGeom prst="rect">
@@ -22376,13 +22411,14 @@
               </p:cNvPr>
               <p:cNvCxnSpPr>
                 <a:cxnSpLocks/>
+                <a:endCxn id="130" idx="1"/>
               </p:cNvCxnSpPr>
               <p:nvPr/>
             </p:nvCxnSpPr>
             <p:spPr>
               <a:xfrm flipV="1">
-                <a:off x="3448050" y="3466817"/>
-                <a:ext cx="469576" cy="382"/>
+                <a:off x="2911269" y="3447507"/>
+                <a:ext cx="224027" cy="1036"/>
               </a:xfrm>
               <a:prstGeom prst="straightConnector1">
                 <a:avLst/>
@@ -22428,8 +22464,8 @@
             </p:nvCxnSpPr>
             <p:spPr>
               <a:xfrm>
-                <a:off x="2264878" y="3467199"/>
-                <a:ext cx="468797" cy="0"/>
+                <a:off x="1873031" y="3457680"/>
+                <a:ext cx="389638" cy="6375"/>
               </a:xfrm>
               <a:prstGeom prst="straightConnector1">
                 <a:avLst/>
@@ -22475,8 +22511,8 @@
             </p:nvCxnSpPr>
             <p:spPr>
               <a:xfrm>
-                <a:off x="1031385" y="3467199"/>
-                <a:ext cx="468797" cy="0"/>
+                <a:off x="1028677" y="3464055"/>
+                <a:ext cx="334456" cy="0"/>
               </a:xfrm>
               <a:prstGeom prst="straightConnector1">
                 <a:avLst/>
@@ -22553,7 +22589,7 @@
           <p:nvPr/>
         </p:nvPicPr>
         <p:blipFill>
-          <a:blip r:embed="rId8">
+          <a:blip r:embed="rId8" cstate="print">
             <a:extLst>
               <a:ext uri="{28A0092B-C50C-407E-A947-70E740481C1C}">
                 <a14:useLocalDpi xmlns:a14="http://schemas.microsoft.com/office/drawing/2010/main" val="0"/>
@@ -22726,7 +22762,7 @@
           <p:nvPr/>
         </p:nvPicPr>
         <p:blipFill>
-          <a:blip r:embed="rId8">
+          <a:blip r:embed="rId8" cstate="print">
             <a:extLst>
               <a:ext uri="{28A0092B-C50C-407E-A947-70E740481C1C}">
                 <a14:useLocalDpi xmlns:a14="http://schemas.microsoft.com/office/drawing/2010/main" val="0"/>
@@ -22899,7 +22935,7 @@
           <p:nvPr/>
         </p:nvPicPr>
         <p:blipFill>
-          <a:blip r:embed="rId8">
+          <a:blip r:embed="rId8" cstate="print">
             <a:extLst>
               <a:ext uri="{28A0092B-C50C-407E-A947-70E740481C1C}">
                 <a14:useLocalDpi xmlns:a14="http://schemas.microsoft.com/office/drawing/2010/main" val="0"/>
@@ -22923,6 +22959,537 @@
           </a:prstGeom>
         </p:spPr>
       </p:pic>
+      <p:sp>
+        <p:nvSpPr>
+          <p:cNvPr id="2" name="Oval 1">
+            <a:extLst>
+              <a:ext uri="{FF2B5EF4-FFF2-40B4-BE49-F238E27FC236}">
+                <a16:creationId xmlns:a16="http://schemas.microsoft.com/office/drawing/2014/main" id="{4B4EE704-2433-468B-BA9D-32DC0DA95360}"/>
+              </a:ext>
+            </a:extLst>
+          </p:cNvPr>
+          <p:cNvSpPr/>
+          <p:nvPr/>
+        </p:nvSpPr>
+        <p:spPr bwMode="auto">
+          <a:xfrm>
+            <a:off x="2262669" y="3174999"/>
+            <a:ext cx="630859" cy="535899"/>
+          </a:xfrm>
+          <a:prstGeom prst="ellipse">
+            <a:avLst/>
+          </a:prstGeom>
+          <a:solidFill>
+            <a:schemeClr val="accent1"/>
+          </a:solidFill>
+          <a:ln>
+            <a:noFill/>
+            <a:headEnd type="none" w="med" len="med"/>
+            <a:tailEnd type="none" w="med" len="med"/>
+          </a:ln>
+          <a:effectLst/>
+        </p:spPr>
+        <p:style>
+          <a:lnRef idx="1">
+            <a:schemeClr val="accent2"/>
+          </a:lnRef>
+          <a:fillRef idx="3">
+            <a:schemeClr val="accent2"/>
+          </a:fillRef>
+          <a:effectRef idx="2">
+            <a:schemeClr val="accent2"/>
+          </a:effectRef>
+          <a:fontRef idx="minor">
+            <a:schemeClr val="lt1"/>
+          </a:fontRef>
+        </p:style>
+        <p:txBody>
+          <a:bodyPr rot="0" spcFirstLastPara="0" vertOverflow="overflow" horzOverflow="overflow" vert="horz" wrap="square" lIns="0" tIns="146304" rIns="0" bIns="146304" numCol="1" spcCol="0" rtlCol="0" fromWordArt="0" anchor="t" anchorCtr="0" forceAA="0" compatLnSpc="1">
+            <a:prstTxWarp prst="textNoShape">
+              <a:avLst/>
+            </a:prstTxWarp>
+            <a:noAutofit/>
+          </a:bodyPr>
+          <a:lstStyle/>
+          <a:p>
+            <a:pPr algn="ctr" defTabSz="932472" fontAlgn="base">
+              <a:lnSpc>
+                <a:spcPct val="90000"/>
+              </a:lnSpc>
+              <a:spcBef>
+                <a:spcPct val="0"/>
+              </a:spcBef>
+              <a:spcAft>
+                <a:spcPct val="0"/>
+              </a:spcAft>
+            </a:pPr>
+            <a:r>
+              <a:rPr lang="en-US" sz="1100" dirty="0">
+                <a:gradFill>
+                  <a:gsLst>
+                    <a:gs pos="0">
+                      <a:srgbClr val="FFFFFF"/>
+                    </a:gs>
+                    <a:gs pos="100000">
+                      <a:srgbClr val="FFFFFF"/>
+                    </a:gs>
+                  </a:gsLst>
+                  <a:lin ang="5400000" scaled="0"/>
+                </a:gradFill>
+                <a:ea typeface="Segoe UI" pitchFamily="34" charset="0"/>
+                <a:cs typeface="Segoe UI" pitchFamily="34" charset="0"/>
+              </a:rPr>
+              <a:t>Build</a:t>
+            </a:r>
+            <a:endParaRPr lang="en-US" sz="700" dirty="0">
+              <a:gradFill>
+                <a:gsLst>
+                  <a:gs pos="0">
+                    <a:srgbClr val="FFFFFF"/>
+                  </a:gs>
+                  <a:gs pos="100000">
+                    <a:srgbClr val="FFFFFF"/>
+                  </a:gs>
+                </a:gsLst>
+                <a:lin ang="5400000" scaled="0"/>
+              </a:gradFill>
+              <a:ea typeface="Segoe UI" pitchFamily="34" charset="0"/>
+              <a:cs typeface="Segoe UI" pitchFamily="34" charset="0"/>
+            </a:endParaRPr>
+          </a:p>
+        </p:txBody>
+      </p:sp>
+      <p:sp>
+        <p:nvSpPr>
+          <p:cNvPr id="49" name="Oval 48">
+            <a:extLst>
+              <a:ext uri="{FF2B5EF4-FFF2-40B4-BE49-F238E27FC236}">
+                <a16:creationId xmlns:a16="http://schemas.microsoft.com/office/drawing/2014/main" id="{2186B738-4B09-40BA-B80B-9C95A989E5CA}"/>
+              </a:ext>
+            </a:extLst>
+          </p:cNvPr>
+          <p:cNvSpPr/>
+          <p:nvPr/>
+        </p:nvSpPr>
+        <p:spPr bwMode="auto">
+          <a:xfrm>
+            <a:off x="3829142" y="3163467"/>
+            <a:ext cx="630859" cy="535899"/>
+          </a:xfrm>
+          <a:prstGeom prst="ellipse">
+            <a:avLst/>
+          </a:prstGeom>
+          <a:solidFill>
+            <a:schemeClr val="accent1"/>
+          </a:solidFill>
+          <a:ln>
+            <a:noFill/>
+            <a:headEnd type="none" w="med" len="med"/>
+            <a:tailEnd type="none" w="med" len="med"/>
+          </a:ln>
+          <a:effectLst/>
+        </p:spPr>
+        <p:style>
+          <a:lnRef idx="1">
+            <a:schemeClr val="accent2"/>
+          </a:lnRef>
+          <a:fillRef idx="3">
+            <a:schemeClr val="accent2"/>
+          </a:fillRef>
+          <a:effectRef idx="2">
+            <a:schemeClr val="accent2"/>
+          </a:effectRef>
+          <a:fontRef idx="minor">
+            <a:schemeClr val="lt1"/>
+          </a:fontRef>
+        </p:style>
+        <p:txBody>
+          <a:bodyPr rot="0" spcFirstLastPara="0" vertOverflow="overflow" horzOverflow="overflow" vert="horz" wrap="square" lIns="0" tIns="146304" rIns="0" bIns="146304" numCol="1" spcCol="0" rtlCol="0" fromWordArt="0" anchor="t" anchorCtr="0" forceAA="0" compatLnSpc="1">
+            <a:prstTxWarp prst="textNoShape">
+              <a:avLst/>
+            </a:prstTxWarp>
+            <a:noAutofit/>
+          </a:bodyPr>
+          <a:lstStyle/>
+          <a:p>
+            <a:pPr algn="ctr" defTabSz="932472" fontAlgn="base">
+              <a:lnSpc>
+                <a:spcPct val="90000"/>
+              </a:lnSpc>
+              <a:spcBef>
+                <a:spcPct val="0"/>
+              </a:spcBef>
+              <a:spcAft>
+                <a:spcPct val="0"/>
+              </a:spcAft>
+            </a:pPr>
+            <a:r>
+              <a:rPr lang="en-US" sz="1100" dirty="0">
+                <a:gradFill>
+                  <a:gsLst>
+                    <a:gs pos="0">
+                      <a:srgbClr val="FFFFFF"/>
+                    </a:gs>
+                    <a:gs pos="100000">
+                      <a:srgbClr val="FFFFFF"/>
+                    </a:gs>
+                  </a:gsLst>
+                  <a:lin ang="5400000" scaled="0"/>
+                </a:gradFill>
+                <a:ea typeface="Segoe UI" pitchFamily="34" charset="0"/>
+                <a:cs typeface="Segoe UI" pitchFamily="34" charset="0"/>
+              </a:rPr>
+              <a:t>Build</a:t>
+            </a:r>
+            <a:endParaRPr lang="en-US" sz="700" dirty="0">
+              <a:gradFill>
+                <a:gsLst>
+                  <a:gs pos="0">
+                    <a:srgbClr val="FFFFFF"/>
+                  </a:gs>
+                  <a:gs pos="100000">
+                    <a:srgbClr val="FFFFFF"/>
+                  </a:gs>
+                </a:gsLst>
+                <a:lin ang="5400000" scaled="0"/>
+              </a:gradFill>
+              <a:ea typeface="Segoe UI" pitchFamily="34" charset="0"/>
+              <a:cs typeface="Segoe UI" pitchFamily="34" charset="0"/>
+            </a:endParaRPr>
+          </a:p>
+        </p:txBody>
+      </p:sp>
+      <p:sp>
+        <p:nvSpPr>
+          <p:cNvPr id="50" name="Oval 49">
+            <a:extLst>
+              <a:ext uri="{FF2B5EF4-FFF2-40B4-BE49-F238E27FC236}">
+                <a16:creationId xmlns:a16="http://schemas.microsoft.com/office/drawing/2014/main" id="{AF9D4943-8C3B-4137-9356-CB6BBAA6003B}"/>
+              </a:ext>
+            </a:extLst>
+          </p:cNvPr>
+          <p:cNvSpPr/>
+          <p:nvPr/>
+        </p:nvSpPr>
+        <p:spPr bwMode="auto">
+          <a:xfrm>
+            <a:off x="5446605" y="3185355"/>
+            <a:ext cx="630859" cy="535899"/>
+          </a:xfrm>
+          <a:prstGeom prst="ellipse">
+            <a:avLst/>
+          </a:prstGeom>
+          <a:solidFill>
+            <a:schemeClr val="accent1"/>
+          </a:solidFill>
+          <a:ln>
+            <a:noFill/>
+            <a:headEnd type="none" w="med" len="med"/>
+            <a:tailEnd type="none" w="med" len="med"/>
+          </a:ln>
+          <a:effectLst/>
+        </p:spPr>
+        <p:style>
+          <a:lnRef idx="1">
+            <a:schemeClr val="accent2"/>
+          </a:lnRef>
+          <a:fillRef idx="3">
+            <a:schemeClr val="accent2"/>
+          </a:fillRef>
+          <a:effectRef idx="2">
+            <a:schemeClr val="accent2"/>
+          </a:effectRef>
+          <a:fontRef idx="minor">
+            <a:schemeClr val="lt1"/>
+          </a:fontRef>
+        </p:style>
+        <p:txBody>
+          <a:bodyPr rot="0" spcFirstLastPara="0" vertOverflow="overflow" horzOverflow="overflow" vert="horz" wrap="square" lIns="0" tIns="146304" rIns="0" bIns="146304" numCol="1" spcCol="0" rtlCol="0" fromWordArt="0" anchor="t" anchorCtr="0" forceAA="0" compatLnSpc="1">
+            <a:prstTxWarp prst="textNoShape">
+              <a:avLst/>
+            </a:prstTxWarp>
+            <a:noAutofit/>
+          </a:bodyPr>
+          <a:lstStyle/>
+          <a:p>
+            <a:pPr algn="ctr" defTabSz="932472" fontAlgn="base">
+              <a:lnSpc>
+                <a:spcPct val="90000"/>
+              </a:lnSpc>
+              <a:spcBef>
+                <a:spcPct val="0"/>
+              </a:spcBef>
+              <a:spcAft>
+                <a:spcPct val="0"/>
+              </a:spcAft>
+            </a:pPr>
+            <a:r>
+              <a:rPr lang="en-US" sz="1100" dirty="0">
+                <a:gradFill>
+                  <a:gsLst>
+                    <a:gs pos="0">
+                      <a:srgbClr val="FFFFFF"/>
+                    </a:gs>
+                    <a:gs pos="100000">
+                      <a:srgbClr val="FFFFFF"/>
+                    </a:gs>
+                  </a:gsLst>
+                  <a:lin ang="5400000" scaled="0"/>
+                </a:gradFill>
+                <a:ea typeface="Segoe UI" pitchFamily="34" charset="0"/>
+                <a:cs typeface="Segoe UI" pitchFamily="34" charset="0"/>
+              </a:rPr>
+              <a:t>Build</a:t>
+            </a:r>
+            <a:endParaRPr lang="en-US" sz="700" dirty="0">
+              <a:gradFill>
+                <a:gsLst>
+                  <a:gs pos="0">
+                    <a:srgbClr val="FFFFFF"/>
+                  </a:gs>
+                  <a:gs pos="100000">
+                    <a:srgbClr val="FFFFFF"/>
+                  </a:gs>
+                </a:gsLst>
+                <a:lin ang="5400000" scaled="0"/>
+              </a:gradFill>
+              <a:ea typeface="Segoe UI" pitchFamily="34" charset="0"/>
+              <a:cs typeface="Segoe UI" pitchFamily="34" charset="0"/>
+            </a:endParaRPr>
+          </a:p>
+        </p:txBody>
+      </p:sp>
+      <p:cxnSp>
+        <p:nvCxnSpPr>
+          <p:cNvPr id="57" name="Straight Arrow Connector 56">
+            <a:extLst>
+              <a:ext uri="{FF2B5EF4-FFF2-40B4-BE49-F238E27FC236}">
+                <a16:creationId xmlns:a16="http://schemas.microsoft.com/office/drawing/2014/main" id="{714CF3C0-7E0A-4FF8-9DE5-80A40AF83418}"/>
+              </a:ext>
+            </a:extLst>
+          </p:cNvPr>
+          <p:cNvCxnSpPr>
+            <a:cxnSpLocks/>
+          </p:cNvCxnSpPr>
+          <p:nvPr/>
+        </p:nvCxnSpPr>
+        <p:spPr>
+          <a:xfrm>
+            <a:off x="3587597" y="3447093"/>
+            <a:ext cx="224027" cy="0"/>
+          </a:xfrm>
+          <a:prstGeom prst="straightConnector1">
+            <a:avLst/>
+          </a:prstGeom>
+          <a:ln>
+            <a:solidFill>
+              <a:schemeClr val="bg1">
+                <a:lumMod val="50000"/>
+              </a:schemeClr>
+            </a:solidFill>
+            <a:headEnd type="none"/>
+            <a:tailEnd type="triangle"/>
+          </a:ln>
+        </p:spPr>
+        <p:style>
+          <a:lnRef idx="1">
+            <a:schemeClr val="accent1"/>
+          </a:lnRef>
+          <a:fillRef idx="0">
+            <a:schemeClr val="accent1"/>
+          </a:fillRef>
+          <a:effectRef idx="0">
+            <a:schemeClr val="accent1"/>
+          </a:effectRef>
+          <a:fontRef idx="minor">
+            <a:schemeClr val="tx1"/>
+          </a:fontRef>
+        </p:style>
+      </p:cxnSp>
+      <p:cxnSp>
+        <p:nvCxnSpPr>
+          <p:cNvPr id="58" name="Straight Arrow Connector 57">
+            <a:extLst>
+              <a:ext uri="{FF2B5EF4-FFF2-40B4-BE49-F238E27FC236}">
+                <a16:creationId xmlns:a16="http://schemas.microsoft.com/office/drawing/2014/main" id="{F589EEB4-875F-49E4-B166-B954DFB991E5}"/>
+              </a:ext>
+            </a:extLst>
+          </p:cNvPr>
+          <p:cNvCxnSpPr>
+            <a:cxnSpLocks/>
+            <a:endCxn id="132" idx="1"/>
+          </p:cNvCxnSpPr>
+          <p:nvPr/>
+        </p:nvCxnSpPr>
+        <p:spPr>
+          <a:xfrm>
+            <a:off x="4382831" y="3440136"/>
+            <a:ext cx="311158" cy="7054"/>
+          </a:xfrm>
+          <a:prstGeom prst="straightConnector1">
+            <a:avLst/>
+          </a:prstGeom>
+          <a:ln>
+            <a:solidFill>
+              <a:schemeClr val="bg1">
+                <a:lumMod val="50000"/>
+              </a:schemeClr>
+            </a:solidFill>
+            <a:headEnd type="none"/>
+            <a:tailEnd type="triangle"/>
+          </a:ln>
+        </p:spPr>
+        <p:style>
+          <a:lnRef idx="1">
+            <a:schemeClr val="accent1"/>
+          </a:lnRef>
+          <a:fillRef idx="0">
+            <a:schemeClr val="accent1"/>
+          </a:fillRef>
+          <a:effectRef idx="0">
+            <a:schemeClr val="accent1"/>
+          </a:effectRef>
+          <a:fontRef idx="minor">
+            <a:schemeClr val="tx1"/>
+          </a:fontRef>
+        </p:style>
+      </p:cxnSp>
+      <p:cxnSp>
+        <p:nvCxnSpPr>
+          <p:cNvPr id="12" name="Straight Connector 11">
+            <a:extLst>
+              <a:ext uri="{FF2B5EF4-FFF2-40B4-BE49-F238E27FC236}">
+                <a16:creationId xmlns:a16="http://schemas.microsoft.com/office/drawing/2014/main" id="{54A5CD9B-7A6D-4C99-A897-8ECB49896E5B}"/>
+              </a:ext>
+            </a:extLst>
+          </p:cNvPr>
+          <p:cNvCxnSpPr/>
+          <p:nvPr/>
+        </p:nvCxnSpPr>
+        <p:spPr>
+          <a:xfrm flipH="1" flipV="1">
+            <a:off x="2709639" y="3710898"/>
+            <a:ext cx="456894" cy="831655"/>
+          </a:xfrm>
+          <a:prstGeom prst="line">
+            <a:avLst/>
+          </a:prstGeom>
+          <a:ln>
+            <a:solidFill>
+              <a:schemeClr val="bg2"/>
+            </a:solidFill>
+            <a:prstDash val="sysDash"/>
+            <a:headEnd type="none"/>
+            <a:tailEnd type="none"/>
+          </a:ln>
+        </p:spPr>
+        <p:style>
+          <a:lnRef idx="1">
+            <a:schemeClr val="accent1"/>
+          </a:lnRef>
+          <a:fillRef idx="0">
+            <a:schemeClr val="accent1"/>
+          </a:fillRef>
+          <a:effectRef idx="0">
+            <a:schemeClr val="accent1"/>
+          </a:effectRef>
+          <a:fontRef idx="minor">
+            <a:schemeClr val="tx1"/>
+          </a:fontRef>
+        </p:style>
+      </p:cxnSp>
+      <p:cxnSp>
+        <p:nvCxnSpPr>
+          <p:cNvPr id="63" name="Straight Connector 62">
+            <a:extLst>
+              <a:ext uri="{FF2B5EF4-FFF2-40B4-BE49-F238E27FC236}">
+                <a16:creationId xmlns:a16="http://schemas.microsoft.com/office/drawing/2014/main" id="{1142DA65-93AC-43C0-83F8-199D10AB81FF}"/>
+              </a:ext>
+            </a:extLst>
+          </p:cNvPr>
+          <p:cNvCxnSpPr>
+            <a:cxnSpLocks/>
+          </p:cNvCxnSpPr>
+          <p:nvPr/>
+        </p:nvCxnSpPr>
+        <p:spPr>
+          <a:xfrm flipV="1">
+            <a:off x="4249762" y="3729061"/>
+            <a:ext cx="1481955" cy="794417"/>
+          </a:xfrm>
+          <a:prstGeom prst="line">
+            <a:avLst/>
+          </a:prstGeom>
+          <a:ln>
+            <a:solidFill>
+              <a:schemeClr val="bg2"/>
+            </a:solidFill>
+            <a:prstDash val="sysDash"/>
+            <a:headEnd type="none"/>
+            <a:tailEnd type="none"/>
+          </a:ln>
+        </p:spPr>
+        <p:style>
+          <a:lnRef idx="1">
+            <a:schemeClr val="accent1"/>
+          </a:lnRef>
+          <a:fillRef idx="0">
+            <a:schemeClr val="accent1"/>
+          </a:fillRef>
+          <a:effectRef idx="0">
+            <a:schemeClr val="accent1"/>
+          </a:effectRef>
+          <a:fontRef idx="minor">
+            <a:schemeClr val="tx1"/>
+          </a:fontRef>
+        </p:style>
+      </p:cxnSp>
+      <p:cxnSp>
+        <p:nvCxnSpPr>
+          <p:cNvPr id="65" name="Straight Connector 64">
+            <a:extLst>
+              <a:ext uri="{FF2B5EF4-FFF2-40B4-BE49-F238E27FC236}">
+                <a16:creationId xmlns:a16="http://schemas.microsoft.com/office/drawing/2014/main" id="{00D79FA4-F55C-44D3-93F9-3BFF8A75E2C2}"/>
+              </a:ext>
+            </a:extLst>
+          </p:cNvPr>
+          <p:cNvCxnSpPr>
+            <a:cxnSpLocks/>
+          </p:cNvCxnSpPr>
+          <p:nvPr/>
+        </p:nvCxnSpPr>
+        <p:spPr>
+          <a:xfrm flipV="1">
+            <a:off x="3946137" y="3685597"/>
+            <a:ext cx="193647" cy="580559"/>
+          </a:xfrm>
+          <a:prstGeom prst="line">
+            <a:avLst/>
+          </a:prstGeom>
+          <a:ln>
+            <a:solidFill>
+              <a:schemeClr val="bg2"/>
+            </a:solidFill>
+            <a:prstDash val="sysDash"/>
+            <a:headEnd type="none"/>
+            <a:tailEnd type="none"/>
+          </a:ln>
+        </p:spPr>
+        <p:style>
+          <a:lnRef idx="1">
+            <a:schemeClr val="accent1"/>
+          </a:lnRef>
+          <a:fillRef idx="0">
+            <a:schemeClr val="accent1"/>
+          </a:fillRef>
+          <a:effectRef idx="0">
+            <a:schemeClr val="accent1"/>
+          </a:effectRef>
+          <a:fontRef idx="minor">
+            <a:schemeClr val="tx1"/>
+          </a:fontRef>
+        </p:style>
+      </p:cxnSp>
     </p:spTree>
     <p:extLst>
       <p:ext uri="{BB962C8B-B14F-4D97-AF65-F5344CB8AC3E}">

</xml_diff>